<commit_message>
Added creds to powerpoint
</commit_message>
<xml_diff>
--- a/LunchNLearn1-Intro/Powerpoint/Docker-Intro.pptx
+++ b/LunchNLearn1-Intro/Powerpoint/Docker-Intro.pptx
@@ -5,7 +5,7 @@
     <p:sldMasterId id="2147483648" r:id="rId4"/>
   </p:sldMasterIdLst>
   <p:notesMasterIdLst>
-    <p:notesMasterId r:id="rId21"/>
+    <p:notesMasterId r:id="rId22"/>
   </p:notesMasterIdLst>
   <p:sldIdLst>
     <p:sldId id="290" r:id="rId5"/>
@@ -16,14 +16,15 @@
     <p:sldId id="300" r:id="rId10"/>
     <p:sldId id="299" r:id="rId11"/>
     <p:sldId id="297" r:id="rId12"/>
-    <p:sldId id="302" r:id="rId13"/>
-    <p:sldId id="304" r:id="rId14"/>
-    <p:sldId id="305" r:id="rId15"/>
+    <p:sldId id="310" r:id="rId13"/>
+    <p:sldId id="311" r:id="rId14"/>
+    <p:sldId id="304" r:id="rId15"/>
     <p:sldId id="303" r:id="rId16"/>
-    <p:sldId id="306" r:id="rId17"/>
-    <p:sldId id="307" r:id="rId18"/>
-    <p:sldId id="308" r:id="rId19"/>
-    <p:sldId id="291" r:id="rId20"/>
+    <p:sldId id="305" r:id="rId17"/>
+    <p:sldId id="306" r:id="rId18"/>
+    <p:sldId id="307" r:id="rId19"/>
+    <p:sldId id="308" r:id="rId20"/>
+    <p:sldId id="291" r:id="rId21"/>
   </p:sldIdLst>
   <p:sldSz cx="9144000" cy="6858000" type="screen4x3"/>
   <p:notesSz cx="6858000" cy="9144000"/>
@@ -223,7 +224,7 @@
           <a:p>
             <a:fld id="{909AFCF1-7F48-4D21-8D27-97E9804428B6}" type="datetimeFigureOut">
               <a:rPr lang="en-US" smtClean="0"/>
-              <a:t>7/22/2019</a:t>
+              <a:t>7/29/2019</a:t>
             </a:fld>
             <a:endParaRPr lang="en-US"/>
           </a:p>
@@ -669,7 +670,7 @@
           <a:p>
             <a:fld id="{A17B4B1F-9ADE-4FEE-88FC-832835B49A13}" type="datetime4">
               <a:rPr lang="en-US" smtClean="0"/>
-              <a:t>July 22, 2019</a:t>
+              <a:t>July 29, 2019</a:t>
             </a:fld>
             <a:endParaRPr lang="en-US" dirty="0"/>
           </a:p>
@@ -1063,7 +1064,7 @@
           <a:p>
             <a:fld id="{CAEF89AF-97FF-41FD-A810-843DAB910B39}" type="datetime4">
               <a:rPr lang="en-US" smtClean="0"/>
-              <a:t>July 22, 2019</a:t>
+              <a:t>July 29, 2019</a:t>
             </a:fld>
             <a:endParaRPr lang="en-US" dirty="0"/>
           </a:p>
@@ -1406,7 +1407,7 @@
           <a:p>
             <a:fld id="{58C37697-90A4-4007-8C23-BAAA588B27B3}" type="datetime4">
               <a:rPr lang="en-US" smtClean="0"/>
-              <a:t>July 22, 2019</a:t>
+              <a:t>July 29, 2019</a:t>
             </a:fld>
             <a:endParaRPr lang="en-US" dirty="0"/>
           </a:p>
@@ -1788,7 +1789,7 @@
           <a:p>
             <a:fld id="{C526132D-74A4-457B-9FB6-E79DB3FA6555}" type="datetime4">
               <a:rPr lang="en-US" smtClean="0"/>
-              <a:t>July 22, 2019</a:t>
+              <a:t>July 29, 2019</a:t>
             </a:fld>
             <a:endParaRPr lang="en-US" dirty="0"/>
           </a:p>
@@ -2124,7 +2125,7 @@
           <a:p>
             <a:fld id="{6A0291C7-F608-4246-89E2-5DBB54EDEF09}" type="datetime4">
               <a:rPr lang="en-US" smtClean="0"/>
-              <a:t>July 22, 2019</a:t>
+              <a:t>July 29, 2019</a:t>
             </a:fld>
             <a:endParaRPr lang="en-US" dirty="0"/>
           </a:p>
@@ -2301,7 +2302,7 @@
           <a:p>
             <a:fld id="{4D013C2E-F697-4ACF-9974-2B7ED63A336A}" type="datetime4">
               <a:rPr lang="en-US" smtClean="0"/>
-              <a:t>July 22, 2019</a:t>
+              <a:t>July 29, 2019</a:t>
             </a:fld>
             <a:endParaRPr lang="en-US" dirty="0"/>
           </a:p>
@@ -2544,7 +2545,7 @@
           <a:p>
             <a:fld id="{D4335327-653A-45BD-A8A4-D16B8D9BB63F}" type="datetime4">
               <a:rPr lang="en-US" smtClean="0"/>
-              <a:t>July 22, 2019</a:t>
+              <a:t>July 29, 2019</a:t>
             </a:fld>
             <a:endParaRPr lang="en-US" dirty="0"/>
           </a:p>
@@ -3016,6 +3017,154 @@
       </p:grpSpPr>
       <p:sp>
         <p:nvSpPr>
+          <p:cNvPr id="2" name="Footer Placeholder 1">
+            <a:extLst>
+              <a:ext uri="{FF2B5EF4-FFF2-40B4-BE49-F238E27FC236}">
+                <a16:creationId xmlns:a16="http://schemas.microsoft.com/office/drawing/2014/main" id="{AD8FF342-8D74-4548-9D56-CC449296B183}"/>
+              </a:ext>
+            </a:extLst>
+          </p:cNvPr>
+          <p:cNvSpPr>
+            <a:spLocks noGrp="1"/>
+          </p:cNvSpPr>
+          <p:nvPr>
+            <p:ph type="ftr" sz="quarter" idx="11"/>
+          </p:nvPr>
+        </p:nvSpPr>
+        <p:spPr/>
+        <p:txBody>
+          <a:bodyPr/>
+          <a:lstStyle/>
+          <a:p>
+            <a:r>
+              <a:rPr lang="en-US"/>
+              <a:t>CONFIDENTIAL &amp; PROPRIETARY</a:t>
+            </a:r>
+            <a:endParaRPr lang="en-US" dirty="0"/>
+          </a:p>
+        </p:txBody>
+      </p:sp>
+      <p:sp>
+        <p:nvSpPr>
+          <p:cNvPr id="3" name="Slide Number Placeholder 2">
+            <a:extLst>
+              <a:ext uri="{FF2B5EF4-FFF2-40B4-BE49-F238E27FC236}">
+                <a16:creationId xmlns:a16="http://schemas.microsoft.com/office/drawing/2014/main" id="{D641B413-2791-4317-A6CB-E66CA7CB598B}"/>
+              </a:ext>
+            </a:extLst>
+          </p:cNvPr>
+          <p:cNvSpPr>
+            <a:spLocks noGrp="1"/>
+          </p:cNvSpPr>
+          <p:nvPr>
+            <p:ph type="sldNum" sz="quarter" idx="12"/>
+          </p:nvPr>
+        </p:nvSpPr>
+        <p:spPr/>
+        <p:txBody>
+          <a:bodyPr/>
+          <a:lstStyle/>
+          <a:p>
+            <a:fld id="{8848E627-D06A-4F0E-98E2-3D90458BE48C}" type="slidenum">
+              <a:rPr lang="en-US" smtClean="0"/>
+              <a:pPr/>
+              <a:t>10</a:t>
+            </a:fld>
+            <a:endParaRPr lang="en-US" dirty="0"/>
+          </a:p>
+        </p:txBody>
+      </p:sp>
+      <p:sp>
+        <p:nvSpPr>
+          <p:cNvPr id="4" name="Date Placeholder 3">
+            <a:extLst>
+              <a:ext uri="{FF2B5EF4-FFF2-40B4-BE49-F238E27FC236}">
+                <a16:creationId xmlns:a16="http://schemas.microsoft.com/office/drawing/2014/main" id="{24E951B1-2B7F-4090-A169-E872CA0238EF}"/>
+              </a:ext>
+            </a:extLst>
+          </p:cNvPr>
+          <p:cNvSpPr>
+            <a:spLocks noGrp="1"/>
+          </p:cNvSpPr>
+          <p:nvPr>
+            <p:ph type="dt" sz="half" idx="10"/>
+          </p:nvPr>
+        </p:nvSpPr>
+        <p:spPr/>
+        <p:txBody>
+          <a:bodyPr/>
+          <a:lstStyle/>
+          <a:p>
+            <a:fld id="{4D013C2E-F697-4ACF-9974-2B7ED63A336A}" type="datetime4">
+              <a:rPr lang="en-US" smtClean="0"/>
+              <a:t>July 29, 2019</a:t>
+            </a:fld>
+            <a:endParaRPr lang="en-US" dirty="0"/>
+          </a:p>
+        </p:txBody>
+      </p:sp>
+      <p:pic>
+        <p:nvPicPr>
+          <p:cNvPr id="7" name="Picture 6">
+            <a:extLst>
+              <a:ext uri="{FF2B5EF4-FFF2-40B4-BE49-F238E27FC236}">
+                <a16:creationId xmlns:a16="http://schemas.microsoft.com/office/drawing/2014/main" id="{DEB5B970-4AAE-4AA9-ACCC-EA6EB93A7E81}"/>
+              </a:ext>
+            </a:extLst>
+          </p:cNvPr>
+          <p:cNvPicPr>
+            <a:picLocks noChangeAspect="1"/>
+          </p:cNvPicPr>
+          <p:nvPr/>
+        </p:nvPicPr>
+        <p:blipFill>
+          <a:blip r:embed="rId2"/>
+          <a:stretch>
+            <a:fillRect/>
+          </a:stretch>
+        </p:blipFill>
+        <p:spPr>
+          <a:xfrm>
+            <a:off x="457200" y="1295400"/>
+            <a:ext cx="8487396" cy="4461790"/>
+          </a:xfrm>
+          <a:prstGeom prst="rect">
+            <a:avLst/>
+          </a:prstGeom>
+        </p:spPr>
+      </p:pic>
+    </p:spTree>
+    <p:extLst>
+      <p:ext uri="{BB962C8B-B14F-4D97-AF65-F5344CB8AC3E}">
+        <p14:creationId xmlns:p14="http://schemas.microsoft.com/office/powerpoint/2010/main" val="3746455664"/>
+      </p:ext>
+    </p:extLst>
+  </p:cSld>
+  <p:clrMapOvr>
+    <a:masterClrMapping/>
+  </p:clrMapOvr>
+</p:sld>
+</file>
+
+<file path=ppt/slides/slide11.xml><?xml version="1.0" encoding="utf-8"?>
+<p:sld xmlns:a="http://schemas.openxmlformats.org/drawingml/2006/main" xmlns:r="http://schemas.openxmlformats.org/officeDocument/2006/relationships" xmlns:p="http://schemas.openxmlformats.org/presentationml/2006/main">
+  <p:cSld>
+    <p:spTree>
+      <p:nvGrpSpPr>
+        <p:cNvPr id="1" name=""/>
+        <p:cNvGrpSpPr/>
+        <p:nvPr/>
+      </p:nvGrpSpPr>
+      <p:grpSpPr>
+        <a:xfrm>
+          <a:off x="0" y="0"/>
+          <a:ext cx="0" cy="0"/>
+          <a:chOff x="0" y="0"/>
+          <a:chExt cx="0" cy="0"/>
+        </a:xfrm>
+      </p:grpSpPr>
+      <p:sp>
+        <p:nvSpPr>
           <p:cNvPr id="2" name="Title 1">
             <a:extLst>
               <a:ext uri="{FF2B5EF4-FFF2-40B4-BE49-F238E27FC236}">
@@ -3110,7 +3259,7 @@
           <a:p>
             <a:fld id="{8848E627-D06A-4F0E-98E2-3D90458BE48C}" type="slidenum">
               <a:rPr lang="en-US" smtClean="0"/>
-              <a:t>10</a:t>
+              <a:t>11</a:t>
             </a:fld>
             <a:endParaRPr lang="en-US"/>
           </a:p>
@@ -3168,7 +3317,7 @@
           <a:p>
             <a:fld id="{CAEF89AF-97FF-41FD-A810-843DAB910B39}" type="datetime4">
               <a:rPr lang="en-US" smtClean="0"/>
-              <a:t>July 22, 2019</a:t>
+              <a:t>July 29, 2019</a:t>
             </a:fld>
             <a:endParaRPr lang="en-US" dirty="0"/>
           </a:p>
@@ -3234,232 +3383,6 @@
 </p:sld>
 </file>
 
-<file path=ppt/slides/slide11.xml><?xml version="1.0" encoding="utf-8"?>
-<p:sld xmlns:a="http://schemas.openxmlformats.org/drawingml/2006/main" xmlns:r="http://schemas.openxmlformats.org/officeDocument/2006/relationships" xmlns:p="http://schemas.openxmlformats.org/presentationml/2006/main">
-  <p:cSld>
-    <p:spTree>
-      <p:nvGrpSpPr>
-        <p:cNvPr id="1" name=""/>
-        <p:cNvGrpSpPr/>
-        <p:nvPr/>
-      </p:nvGrpSpPr>
-      <p:grpSpPr>
-        <a:xfrm>
-          <a:off x="0" y="0"/>
-          <a:ext cx="0" cy="0"/>
-          <a:chOff x="0" y="0"/>
-          <a:chExt cx="0" cy="0"/>
-        </a:xfrm>
-      </p:grpSpPr>
-      <p:sp>
-        <p:nvSpPr>
-          <p:cNvPr id="2" name="Title 1">
-            <a:extLst>
-              <a:ext uri="{FF2B5EF4-FFF2-40B4-BE49-F238E27FC236}">
-                <a16:creationId xmlns:a16="http://schemas.microsoft.com/office/drawing/2014/main" id="{D64D32FA-4C41-4E25-803E-0C328923B652}"/>
-              </a:ext>
-            </a:extLst>
-          </p:cNvPr>
-          <p:cNvSpPr>
-            <a:spLocks noGrp="1"/>
-          </p:cNvSpPr>
-          <p:nvPr>
-            <p:ph type="title"/>
-          </p:nvPr>
-        </p:nvSpPr>
-        <p:spPr/>
-        <p:txBody>
-          <a:bodyPr/>
-          <a:lstStyle/>
-          <a:p>
-            <a:r>
-              <a:rPr lang="en-US" dirty="0"/>
-              <a:t>Registry</a:t>
-            </a:r>
-          </a:p>
-        </p:txBody>
-      </p:sp>
-      <p:sp>
-        <p:nvSpPr>
-          <p:cNvPr id="3" name="Content Placeholder 2">
-            <a:extLst>
-              <a:ext uri="{FF2B5EF4-FFF2-40B4-BE49-F238E27FC236}">
-                <a16:creationId xmlns:a16="http://schemas.microsoft.com/office/drawing/2014/main" id="{3E9F35FD-4C5F-4B12-9CD6-80FAC1774A6F}"/>
-              </a:ext>
-            </a:extLst>
-          </p:cNvPr>
-          <p:cNvSpPr>
-            <a:spLocks noGrp="1"/>
-          </p:cNvSpPr>
-          <p:nvPr>
-            <p:ph idx="1"/>
-          </p:nvPr>
-        </p:nvSpPr>
-        <p:spPr/>
-        <p:txBody>
-          <a:bodyPr/>
-          <a:lstStyle/>
-          <a:p>
-            <a:r>
-              <a:rPr lang="en-US" dirty="0"/>
-              <a:t>Images are stored in a registry in a repository</a:t>
-            </a:r>
-          </a:p>
-          <a:p>
-            <a:endParaRPr lang="en-US" dirty="0"/>
-          </a:p>
-          <a:p>
-            <a:endParaRPr lang="en-US" dirty="0"/>
-          </a:p>
-        </p:txBody>
-      </p:sp>
-      <p:sp>
-        <p:nvSpPr>
-          <p:cNvPr id="4" name="Slide Number Placeholder 3">
-            <a:extLst>
-              <a:ext uri="{FF2B5EF4-FFF2-40B4-BE49-F238E27FC236}">
-                <a16:creationId xmlns:a16="http://schemas.microsoft.com/office/drawing/2014/main" id="{D37A01A3-4BB9-4F09-876A-E3FB40A8FB05}"/>
-              </a:ext>
-            </a:extLst>
-          </p:cNvPr>
-          <p:cNvSpPr>
-            <a:spLocks noGrp="1"/>
-          </p:cNvSpPr>
-          <p:nvPr>
-            <p:ph type="sldNum" sz="quarter" idx="12"/>
-          </p:nvPr>
-        </p:nvSpPr>
-        <p:spPr/>
-        <p:txBody>
-          <a:bodyPr/>
-          <a:lstStyle/>
-          <a:p>
-            <a:fld id="{8848E627-D06A-4F0E-98E2-3D90458BE48C}" type="slidenum">
-              <a:rPr lang="en-US" smtClean="0"/>
-              <a:t>11</a:t>
-            </a:fld>
-            <a:endParaRPr lang="en-US"/>
-          </a:p>
-        </p:txBody>
-      </p:sp>
-      <p:sp>
-        <p:nvSpPr>
-          <p:cNvPr id="5" name="Footer Placeholder 4">
-            <a:extLst>
-              <a:ext uri="{FF2B5EF4-FFF2-40B4-BE49-F238E27FC236}">
-                <a16:creationId xmlns:a16="http://schemas.microsoft.com/office/drawing/2014/main" id="{EA048BD5-A133-4E1B-8BA6-D1B676D348D7}"/>
-              </a:ext>
-            </a:extLst>
-          </p:cNvPr>
-          <p:cNvSpPr>
-            <a:spLocks noGrp="1"/>
-          </p:cNvSpPr>
-          <p:nvPr>
-            <p:ph type="ftr" sz="quarter" idx="3"/>
-          </p:nvPr>
-        </p:nvSpPr>
-        <p:spPr/>
-        <p:txBody>
-          <a:bodyPr/>
-          <a:lstStyle/>
-          <a:p>
-            <a:r>
-              <a:rPr lang="en-US"/>
-              <a:t>CONFIDENTIAL &amp; PROPRIETARY</a:t>
-            </a:r>
-            <a:endParaRPr lang="en-US" dirty="0"/>
-          </a:p>
-        </p:txBody>
-      </p:sp>
-      <p:sp>
-        <p:nvSpPr>
-          <p:cNvPr id="6" name="Date Placeholder 5">
-            <a:extLst>
-              <a:ext uri="{FF2B5EF4-FFF2-40B4-BE49-F238E27FC236}">
-                <a16:creationId xmlns:a16="http://schemas.microsoft.com/office/drawing/2014/main" id="{3DA9A6A5-AC7E-41C0-806E-D1743E943E36}"/>
-              </a:ext>
-            </a:extLst>
-          </p:cNvPr>
-          <p:cNvSpPr>
-            <a:spLocks noGrp="1"/>
-          </p:cNvSpPr>
-          <p:nvPr>
-            <p:ph type="dt" sz="half" idx="10"/>
-          </p:nvPr>
-        </p:nvSpPr>
-        <p:spPr/>
-        <p:txBody>
-          <a:bodyPr/>
-          <a:lstStyle/>
-          <a:p>
-            <a:fld id="{CAEF89AF-97FF-41FD-A810-843DAB910B39}" type="datetime4">
-              <a:rPr lang="en-US" smtClean="0"/>
-              <a:t>July 22, 2019</a:t>
-            </a:fld>
-            <a:endParaRPr lang="en-US" dirty="0"/>
-          </a:p>
-        </p:txBody>
-      </p:sp>
-      <p:pic>
-        <p:nvPicPr>
-          <p:cNvPr id="4098" name="Picture 2" descr="Image result for docker registry">
-            <a:extLst>
-              <a:ext uri="{FF2B5EF4-FFF2-40B4-BE49-F238E27FC236}">
-                <a16:creationId xmlns:a16="http://schemas.microsoft.com/office/drawing/2014/main" id="{93BA40DF-8CF2-4D30-B5B0-0A2053D5BBC4}"/>
-              </a:ext>
-            </a:extLst>
-          </p:cNvPr>
-          <p:cNvPicPr>
-            <a:picLocks noChangeAspect="1" noChangeArrowheads="1"/>
-          </p:cNvPicPr>
-          <p:nvPr/>
-        </p:nvPicPr>
-        <p:blipFill>
-          <a:blip r:embed="rId2">
-            <a:extLst>
-              <a:ext uri="{28A0092B-C50C-407E-A947-70E740481C1C}">
-                <a14:useLocalDpi xmlns:a14="http://schemas.microsoft.com/office/drawing/2010/main" val="0"/>
-              </a:ext>
-            </a:extLst>
-          </a:blip>
-          <a:srcRect/>
-          <a:stretch>
-            <a:fillRect/>
-          </a:stretch>
-        </p:blipFill>
-        <p:spPr bwMode="auto">
-          <a:xfrm>
-            <a:off x="1905000" y="2580756"/>
-            <a:ext cx="5138737" cy="4247865"/>
-          </a:xfrm>
-          <a:prstGeom prst="rect">
-            <a:avLst/>
-          </a:prstGeom>
-          <a:noFill/>
-          <a:extLst>
-            <a:ext uri="{909E8E84-426E-40DD-AFC4-6F175D3DCCD1}">
-              <a14:hiddenFill xmlns:a14="http://schemas.microsoft.com/office/drawing/2010/main">
-                <a:solidFill>
-                  <a:srgbClr val="FFFFFF"/>
-                </a:solidFill>
-              </a14:hiddenFill>
-            </a:ext>
-          </a:extLst>
-        </p:spPr>
-      </p:pic>
-    </p:spTree>
-    <p:extLst>
-      <p:ext uri="{BB962C8B-B14F-4D97-AF65-F5344CB8AC3E}">
-        <p14:creationId xmlns:p14="http://schemas.microsoft.com/office/powerpoint/2010/main" val="44280243"/>
-      </p:ext>
-    </p:extLst>
-  </p:cSld>
-  <p:clrMapOvr>
-    <a:masterClrMapping/>
-  </p:clrMapOvr>
-</p:sld>
-</file>
-
 <file path=ppt/slides/slide12.xml><?xml version="1.0" encoding="utf-8"?>
 <p:sld xmlns:a="http://schemas.openxmlformats.org/drawingml/2006/main" xmlns:r="http://schemas.openxmlformats.org/officeDocument/2006/relationships" xmlns:p="http://schemas.openxmlformats.org/presentationml/2006/main">
   <p:cSld>
@@ -3620,7 +3543,7 @@
           <a:p>
             <a:fld id="{CAEF89AF-97FF-41FD-A810-843DAB910B39}" type="datetime4">
               <a:rPr lang="en-US" smtClean="0"/>
-              <a:t>July 22, 2019</a:t>
+              <a:t>July 29, 2019</a:t>
             </a:fld>
             <a:endParaRPr lang="en-US" dirty="0"/>
           </a:p>
@@ -3708,7 +3631,7 @@
           <p:cNvPr id="2" name="Title 1">
             <a:extLst>
               <a:ext uri="{FF2B5EF4-FFF2-40B4-BE49-F238E27FC236}">
-                <a16:creationId xmlns:a16="http://schemas.microsoft.com/office/drawing/2014/main" id="{9F96E460-15BD-4A95-9CC3-E9C100ECC2E1}"/>
+                <a16:creationId xmlns:a16="http://schemas.microsoft.com/office/drawing/2014/main" id="{D64D32FA-4C41-4E25-803E-0C328923B652}"/>
               </a:ext>
             </a:extLst>
           </p:cNvPr>
@@ -3726,8 +3649,42 @@
           <a:p>
             <a:r>
               <a:rPr lang="en-US" dirty="0"/>
-              <a:t>LABS</a:t>
-            </a:r>
+              <a:t>Registry</a:t>
+            </a:r>
+          </a:p>
+        </p:txBody>
+      </p:sp>
+      <p:sp>
+        <p:nvSpPr>
+          <p:cNvPr id="3" name="Content Placeholder 2">
+            <a:extLst>
+              <a:ext uri="{FF2B5EF4-FFF2-40B4-BE49-F238E27FC236}">
+                <a16:creationId xmlns:a16="http://schemas.microsoft.com/office/drawing/2014/main" id="{3E9F35FD-4C5F-4B12-9CD6-80FAC1774A6F}"/>
+              </a:ext>
+            </a:extLst>
+          </p:cNvPr>
+          <p:cNvSpPr>
+            <a:spLocks noGrp="1"/>
+          </p:cNvSpPr>
+          <p:nvPr>
+            <p:ph idx="1"/>
+          </p:nvPr>
+        </p:nvSpPr>
+        <p:spPr/>
+        <p:txBody>
+          <a:bodyPr/>
+          <a:lstStyle/>
+          <a:p>
+            <a:r>
+              <a:rPr lang="en-US" dirty="0"/>
+              <a:t>Images are stored in a registry in a repository</a:t>
+            </a:r>
+          </a:p>
+          <a:p>
+            <a:endParaRPr lang="en-US" dirty="0"/>
+          </a:p>
+          <a:p>
+            <a:endParaRPr lang="en-US" dirty="0"/>
           </a:p>
         </p:txBody>
       </p:sp>
@@ -3736,7 +3693,7 @@
           <p:cNvPr id="4" name="Slide Number Placeholder 3">
             <a:extLst>
               <a:ext uri="{FF2B5EF4-FFF2-40B4-BE49-F238E27FC236}">
-                <a16:creationId xmlns:a16="http://schemas.microsoft.com/office/drawing/2014/main" id="{D2DD52C1-5C34-47D6-A8E1-679D0717C2F8}"/>
+                <a16:creationId xmlns:a16="http://schemas.microsoft.com/office/drawing/2014/main" id="{D37A01A3-4BB9-4F09-876A-E3FB40A8FB05}"/>
               </a:ext>
             </a:extLst>
           </p:cNvPr>
@@ -3765,7 +3722,7 @@
           <p:cNvPr id="5" name="Footer Placeholder 4">
             <a:extLst>
               <a:ext uri="{FF2B5EF4-FFF2-40B4-BE49-F238E27FC236}">
-                <a16:creationId xmlns:a16="http://schemas.microsoft.com/office/drawing/2014/main" id="{F4388907-BEF9-40E6-B842-9F9AEFA05B14}"/>
+                <a16:creationId xmlns:a16="http://schemas.microsoft.com/office/drawing/2014/main" id="{EA048BD5-A133-4E1B-8BA6-D1B676D348D7}"/>
               </a:ext>
             </a:extLst>
           </p:cNvPr>
@@ -3794,7 +3751,7 @@
           <p:cNvPr id="6" name="Date Placeholder 5">
             <a:extLst>
               <a:ext uri="{FF2B5EF4-FFF2-40B4-BE49-F238E27FC236}">
-                <a16:creationId xmlns:a16="http://schemas.microsoft.com/office/drawing/2014/main" id="{88C7F835-D315-42B7-B1CB-ACAA8E808D5A}"/>
+                <a16:creationId xmlns:a16="http://schemas.microsoft.com/office/drawing/2014/main" id="{3DA9A6A5-AC7E-41C0-806E-D1743E943E36}"/>
               </a:ext>
             </a:extLst>
           </p:cNvPr>
@@ -3812,7 +3769,199 @@
           <a:p>
             <a:fld id="{CAEF89AF-97FF-41FD-A810-843DAB910B39}" type="datetime4">
               <a:rPr lang="en-US" smtClean="0"/>
-              <a:t>July 22, 2019</a:t>
+              <a:t>July 29, 2019</a:t>
+            </a:fld>
+            <a:endParaRPr lang="en-US" dirty="0"/>
+          </a:p>
+        </p:txBody>
+      </p:sp>
+      <p:pic>
+        <p:nvPicPr>
+          <p:cNvPr id="4098" name="Picture 2" descr="Image result for docker registry">
+            <a:extLst>
+              <a:ext uri="{FF2B5EF4-FFF2-40B4-BE49-F238E27FC236}">
+                <a16:creationId xmlns:a16="http://schemas.microsoft.com/office/drawing/2014/main" id="{93BA40DF-8CF2-4D30-B5B0-0A2053D5BBC4}"/>
+              </a:ext>
+            </a:extLst>
+          </p:cNvPr>
+          <p:cNvPicPr>
+            <a:picLocks noChangeAspect="1" noChangeArrowheads="1"/>
+          </p:cNvPicPr>
+          <p:nvPr/>
+        </p:nvPicPr>
+        <p:blipFill>
+          <a:blip r:embed="rId2">
+            <a:extLst>
+              <a:ext uri="{28A0092B-C50C-407E-A947-70E740481C1C}">
+                <a14:useLocalDpi xmlns:a14="http://schemas.microsoft.com/office/drawing/2010/main" val="0"/>
+              </a:ext>
+            </a:extLst>
+          </a:blip>
+          <a:srcRect/>
+          <a:stretch>
+            <a:fillRect/>
+          </a:stretch>
+        </p:blipFill>
+        <p:spPr bwMode="auto">
+          <a:xfrm>
+            <a:off x="1905000" y="2580756"/>
+            <a:ext cx="5138737" cy="4247865"/>
+          </a:xfrm>
+          <a:prstGeom prst="rect">
+            <a:avLst/>
+          </a:prstGeom>
+          <a:noFill/>
+          <a:extLst>
+            <a:ext uri="{909E8E84-426E-40DD-AFC4-6F175D3DCCD1}">
+              <a14:hiddenFill xmlns:a14="http://schemas.microsoft.com/office/drawing/2010/main">
+                <a:solidFill>
+                  <a:srgbClr val="FFFFFF"/>
+                </a:solidFill>
+              </a14:hiddenFill>
+            </a:ext>
+          </a:extLst>
+        </p:spPr>
+      </p:pic>
+    </p:spTree>
+    <p:extLst>
+      <p:ext uri="{BB962C8B-B14F-4D97-AF65-F5344CB8AC3E}">
+        <p14:creationId xmlns:p14="http://schemas.microsoft.com/office/powerpoint/2010/main" val="44280243"/>
+      </p:ext>
+    </p:extLst>
+  </p:cSld>
+  <p:clrMapOvr>
+    <a:masterClrMapping/>
+  </p:clrMapOvr>
+</p:sld>
+</file>
+
+<file path=ppt/slides/slide14.xml><?xml version="1.0" encoding="utf-8"?>
+<p:sld xmlns:a="http://schemas.openxmlformats.org/drawingml/2006/main" xmlns:r="http://schemas.openxmlformats.org/officeDocument/2006/relationships" xmlns:p="http://schemas.openxmlformats.org/presentationml/2006/main">
+  <p:cSld>
+    <p:spTree>
+      <p:nvGrpSpPr>
+        <p:cNvPr id="1" name=""/>
+        <p:cNvGrpSpPr/>
+        <p:nvPr/>
+      </p:nvGrpSpPr>
+      <p:grpSpPr>
+        <a:xfrm>
+          <a:off x="0" y="0"/>
+          <a:ext cx="0" cy="0"/>
+          <a:chOff x="0" y="0"/>
+          <a:chExt cx="0" cy="0"/>
+        </a:xfrm>
+      </p:grpSpPr>
+      <p:sp>
+        <p:nvSpPr>
+          <p:cNvPr id="2" name="Title 1">
+            <a:extLst>
+              <a:ext uri="{FF2B5EF4-FFF2-40B4-BE49-F238E27FC236}">
+                <a16:creationId xmlns:a16="http://schemas.microsoft.com/office/drawing/2014/main" id="{9F96E460-15BD-4A95-9CC3-E9C100ECC2E1}"/>
+              </a:ext>
+            </a:extLst>
+          </p:cNvPr>
+          <p:cNvSpPr>
+            <a:spLocks noGrp="1"/>
+          </p:cNvSpPr>
+          <p:nvPr>
+            <p:ph type="title"/>
+          </p:nvPr>
+        </p:nvSpPr>
+        <p:spPr/>
+        <p:txBody>
+          <a:bodyPr/>
+          <a:lstStyle/>
+          <a:p>
+            <a:r>
+              <a:rPr lang="en-US" dirty="0"/>
+              <a:t>LABS</a:t>
+            </a:r>
+          </a:p>
+        </p:txBody>
+      </p:sp>
+      <p:sp>
+        <p:nvSpPr>
+          <p:cNvPr id="4" name="Slide Number Placeholder 3">
+            <a:extLst>
+              <a:ext uri="{FF2B5EF4-FFF2-40B4-BE49-F238E27FC236}">
+                <a16:creationId xmlns:a16="http://schemas.microsoft.com/office/drawing/2014/main" id="{D2DD52C1-5C34-47D6-A8E1-679D0717C2F8}"/>
+              </a:ext>
+            </a:extLst>
+          </p:cNvPr>
+          <p:cNvSpPr>
+            <a:spLocks noGrp="1"/>
+          </p:cNvSpPr>
+          <p:nvPr>
+            <p:ph type="sldNum" sz="quarter" idx="12"/>
+          </p:nvPr>
+        </p:nvSpPr>
+        <p:spPr/>
+        <p:txBody>
+          <a:bodyPr/>
+          <a:lstStyle/>
+          <a:p>
+            <a:fld id="{8848E627-D06A-4F0E-98E2-3D90458BE48C}" type="slidenum">
+              <a:rPr lang="en-US" smtClean="0"/>
+              <a:t>14</a:t>
+            </a:fld>
+            <a:endParaRPr lang="en-US"/>
+          </a:p>
+        </p:txBody>
+      </p:sp>
+      <p:sp>
+        <p:nvSpPr>
+          <p:cNvPr id="5" name="Footer Placeholder 4">
+            <a:extLst>
+              <a:ext uri="{FF2B5EF4-FFF2-40B4-BE49-F238E27FC236}">
+                <a16:creationId xmlns:a16="http://schemas.microsoft.com/office/drawing/2014/main" id="{F4388907-BEF9-40E6-B842-9F9AEFA05B14}"/>
+              </a:ext>
+            </a:extLst>
+          </p:cNvPr>
+          <p:cNvSpPr>
+            <a:spLocks noGrp="1"/>
+          </p:cNvSpPr>
+          <p:nvPr>
+            <p:ph type="ftr" sz="quarter" idx="3"/>
+          </p:nvPr>
+        </p:nvSpPr>
+        <p:spPr/>
+        <p:txBody>
+          <a:bodyPr/>
+          <a:lstStyle/>
+          <a:p>
+            <a:r>
+              <a:rPr lang="en-US"/>
+              <a:t>CONFIDENTIAL &amp; PROPRIETARY</a:t>
+            </a:r>
+            <a:endParaRPr lang="en-US" dirty="0"/>
+          </a:p>
+        </p:txBody>
+      </p:sp>
+      <p:sp>
+        <p:nvSpPr>
+          <p:cNvPr id="6" name="Date Placeholder 5">
+            <a:extLst>
+              <a:ext uri="{FF2B5EF4-FFF2-40B4-BE49-F238E27FC236}">
+                <a16:creationId xmlns:a16="http://schemas.microsoft.com/office/drawing/2014/main" id="{88C7F835-D315-42B7-B1CB-ACAA8E808D5A}"/>
+              </a:ext>
+            </a:extLst>
+          </p:cNvPr>
+          <p:cNvSpPr>
+            <a:spLocks noGrp="1"/>
+          </p:cNvSpPr>
+          <p:nvPr>
+            <p:ph type="dt" sz="half" idx="10"/>
+          </p:nvPr>
+        </p:nvSpPr>
+        <p:spPr/>
+        <p:txBody>
+          <a:bodyPr/>
+          <a:lstStyle/>
+          <a:p>
+            <a:fld id="{CAEF89AF-97FF-41FD-A810-843DAB910B39}" type="datetime4">
+              <a:rPr lang="en-US" smtClean="0"/>
+              <a:t>July 29, 2019</a:t>
             </a:fld>
             <a:endParaRPr lang="en-US" dirty="0"/>
           </a:p>
@@ -3880,250 +4029,6 @@
 </p:sld>
 </file>
 
-<file path=ppt/slides/slide14.xml><?xml version="1.0" encoding="utf-8"?>
-<p:sld xmlns:a="http://schemas.openxmlformats.org/drawingml/2006/main" xmlns:r="http://schemas.openxmlformats.org/officeDocument/2006/relationships" xmlns:p="http://schemas.openxmlformats.org/presentationml/2006/main">
-  <p:cSld>
-    <p:spTree>
-      <p:nvGrpSpPr>
-        <p:cNvPr id="1" name=""/>
-        <p:cNvGrpSpPr/>
-        <p:nvPr/>
-      </p:nvGrpSpPr>
-      <p:grpSpPr>
-        <a:xfrm>
-          <a:off x="0" y="0"/>
-          <a:ext cx="0" cy="0"/>
-          <a:chOff x="0" y="0"/>
-          <a:chExt cx="0" cy="0"/>
-        </a:xfrm>
-      </p:grpSpPr>
-      <p:sp>
-        <p:nvSpPr>
-          <p:cNvPr id="2" name="Title 1">
-            <a:extLst>
-              <a:ext uri="{FF2B5EF4-FFF2-40B4-BE49-F238E27FC236}">
-                <a16:creationId xmlns:a16="http://schemas.microsoft.com/office/drawing/2014/main" id="{574352A3-B330-4048-8684-6E31DF2A3EF8}"/>
-              </a:ext>
-            </a:extLst>
-          </p:cNvPr>
-          <p:cNvSpPr>
-            <a:spLocks noGrp="1"/>
-          </p:cNvSpPr>
-          <p:nvPr>
-            <p:ph type="title"/>
-          </p:nvPr>
-        </p:nvSpPr>
-        <p:spPr/>
-        <p:txBody>
-          <a:bodyPr/>
-          <a:lstStyle/>
-          <a:p>
-            <a:r>
-              <a:rPr lang="en-US" dirty="0"/>
-              <a:t>Private Registry info</a:t>
-            </a:r>
-          </a:p>
-        </p:txBody>
-      </p:sp>
-      <p:sp>
-        <p:nvSpPr>
-          <p:cNvPr id="3" name="Content Placeholder 2">
-            <a:extLst>
-              <a:ext uri="{FF2B5EF4-FFF2-40B4-BE49-F238E27FC236}">
-                <a16:creationId xmlns:a16="http://schemas.microsoft.com/office/drawing/2014/main" id="{618E685F-3A32-4D48-BE58-BFC077369B82}"/>
-              </a:ext>
-            </a:extLst>
-          </p:cNvPr>
-          <p:cNvSpPr>
-            <a:spLocks noGrp="1"/>
-          </p:cNvSpPr>
-          <p:nvPr>
-            <p:ph idx="1"/>
-          </p:nvPr>
-        </p:nvSpPr>
-        <p:spPr>
-          <a:xfrm>
-            <a:off x="457200" y="1600201"/>
-            <a:ext cx="8229600" cy="4190999"/>
-          </a:xfrm>
-        </p:spPr>
-        <p:txBody>
-          <a:bodyPr/>
-          <a:lstStyle/>
-          <a:p>
-            <a:pPr marL="0" indent="0">
-              <a:buNone/>
-            </a:pPr>
-            <a:r>
-              <a:rPr lang="en-US" dirty="0"/>
-              <a:t>FQDN:</a:t>
-            </a:r>
-          </a:p>
-          <a:p>
-            <a:pPr marL="400050" lvl="1" indent="0">
-              <a:buNone/>
-            </a:pPr>
-            <a:r>
-              <a:rPr lang="en-US" dirty="0">
-                <a:solidFill>
-                  <a:srgbClr val="0070C0"/>
-                </a:solidFill>
-              </a:rPr>
-              <a:t>zoecontainerreg.azurecr.io</a:t>
-            </a:r>
-            <a:endParaRPr lang="en-US" dirty="0"/>
-          </a:p>
-          <a:p>
-            <a:pPr marL="0" indent="0">
-              <a:buNone/>
-            </a:pPr>
-            <a:r>
-              <a:rPr lang="en-US" dirty="0"/>
-              <a:t>Username:</a:t>
-            </a:r>
-          </a:p>
-          <a:p>
-            <a:pPr marL="400050" lvl="1" indent="0">
-              <a:buNone/>
-            </a:pPr>
-            <a:r>
-              <a:rPr lang="en-US" dirty="0" err="1">
-                <a:solidFill>
-                  <a:srgbClr val="0070C0"/>
-                </a:solidFill>
-              </a:rPr>
-              <a:t>zoecontainerreg</a:t>
-            </a:r>
-            <a:endParaRPr lang="en-US" dirty="0">
-              <a:solidFill>
-                <a:srgbClr val="0070C0"/>
-              </a:solidFill>
-            </a:endParaRPr>
-          </a:p>
-          <a:p>
-            <a:pPr marL="0" indent="0">
-              <a:buNone/>
-            </a:pPr>
-            <a:r>
-              <a:rPr lang="en-US" dirty="0"/>
-              <a:t>Password:</a:t>
-            </a:r>
-          </a:p>
-          <a:p>
-            <a:pPr marL="400050" lvl="1" indent="0">
-              <a:buNone/>
-            </a:pPr>
-            <a:r>
-              <a:rPr lang="en-US" dirty="0">
-                <a:solidFill>
-                  <a:srgbClr val="0070C0"/>
-                </a:solidFill>
-              </a:rPr>
-              <a:t>TLCj2xrtLjR8ajml0UN=OeXuMdL8kxYH</a:t>
-            </a:r>
-          </a:p>
-        </p:txBody>
-      </p:sp>
-      <p:sp>
-        <p:nvSpPr>
-          <p:cNvPr id="4" name="Slide Number Placeholder 3">
-            <a:extLst>
-              <a:ext uri="{FF2B5EF4-FFF2-40B4-BE49-F238E27FC236}">
-                <a16:creationId xmlns:a16="http://schemas.microsoft.com/office/drawing/2014/main" id="{700E5982-356B-4187-83F6-4E7A14E37056}"/>
-              </a:ext>
-            </a:extLst>
-          </p:cNvPr>
-          <p:cNvSpPr>
-            <a:spLocks noGrp="1"/>
-          </p:cNvSpPr>
-          <p:nvPr>
-            <p:ph type="sldNum" sz="quarter" idx="12"/>
-          </p:nvPr>
-        </p:nvSpPr>
-        <p:spPr/>
-        <p:txBody>
-          <a:bodyPr/>
-          <a:lstStyle/>
-          <a:p>
-            <a:fld id="{8848E627-D06A-4F0E-98E2-3D90458BE48C}" type="slidenum">
-              <a:rPr lang="en-US" smtClean="0"/>
-              <a:t>14</a:t>
-            </a:fld>
-            <a:endParaRPr lang="en-US"/>
-          </a:p>
-        </p:txBody>
-      </p:sp>
-      <p:sp>
-        <p:nvSpPr>
-          <p:cNvPr id="5" name="Footer Placeholder 4">
-            <a:extLst>
-              <a:ext uri="{FF2B5EF4-FFF2-40B4-BE49-F238E27FC236}">
-                <a16:creationId xmlns:a16="http://schemas.microsoft.com/office/drawing/2014/main" id="{8CA56F73-09AE-4E5D-BE5F-243A720DD605}"/>
-              </a:ext>
-            </a:extLst>
-          </p:cNvPr>
-          <p:cNvSpPr>
-            <a:spLocks noGrp="1"/>
-          </p:cNvSpPr>
-          <p:nvPr>
-            <p:ph type="ftr" sz="quarter" idx="3"/>
-          </p:nvPr>
-        </p:nvSpPr>
-        <p:spPr/>
-        <p:txBody>
-          <a:bodyPr/>
-          <a:lstStyle/>
-          <a:p>
-            <a:r>
-              <a:rPr lang="en-US"/>
-              <a:t>CONFIDENTIAL &amp; PROPRIETARY</a:t>
-            </a:r>
-            <a:endParaRPr lang="en-US" dirty="0"/>
-          </a:p>
-        </p:txBody>
-      </p:sp>
-      <p:sp>
-        <p:nvSpPr>
-          <p:cNvPr id="6" name="Date Placeholder 5">
-            <a:extLst>
-              <a:ext uri="{FF2B5EF4-FFF2-40B4-BE49-F238E27FC236}">
-                <a16:creationId xmlns:a16="http://schemas.microsoft.com/office/drawing/2014/main" id="{6979DE41-14A4-47B6-B6EC-C46BB20EBA90}"/>
-              </a:ext>
-            </a:extLst>
-          </p:cNvPr>
-          <p:cNvSpPr>
-            <a:spLocks noGrp="1"/>
-          </p:cNvSpPr>
-          <p:nvPr>
-            <p:ph type="dt" sz="half" idx="10"/>
-          </p:nvPr>
-        </p:nvSpPr>
-        <p:spPr/>
-        <p:txBody>
-          <a:bodyPr/>
-          <a:lstStyle/>
-          <a:p>
-            <a:fld id="{CAEF89AF-97FF-41FD-A810-843DAB910B39}" type="datetime4">
-              <a:rPr lang="en-US" smtClean="0"/>
-              <a:t>July 22, 2019</a:t>
-            </a:fld>
-            <a:endParaRPr lang="en-US" dirty="0"/>
-          </a:p>
-        </p:txBody>
-      </p:sp>
-    </p:spTree>
-    <p:extLst>
-      <p:ext uri="{BB962C8B-B14F-4D97-AF65-F5344CB8AC3E}">
-        <p14:creationId xmlns:p14="http://schemas.microsoft.com/office/powerpoint/2010/main" val="4065564631"/>
-      </p:ext>
-    </p:extLst>
-  </p:cSld>
-  <p:clrMapOvr>
-    <a:masterClrMapping/>
-  </p:clrMapOvr>
-</p:sld>
-</file>
-
 <file path=ppt/slides/slide15.xml><?xml version="1.0" encoding="utf-8"?>
 <p:sld xmlns:a="http://schemas.openxmlformats.org/drawingml/2006/main" xmlns:r="http://schemas.openxmlformats.org/officeDocument/2006/relationships" xmlns:p="http://schemas.openxmlformats.org/presentationml/2006/main">
   <p:cSld>
@@ -4143,10 +4048,10 @@
       </p:grpSpPr>
       <p:sp>
         <p:nvSpPr>
-          <p:cNvPr id="2" name="Footer Placeholder 1">
+          <p:cNvPr id="2" name="Title 1">
             <a:extLst>
               <a:ext uri="{FF2B5EF4-FFF2-40B4-BE49-F238E27FC236}">
-                <a16:creationId xmlns:a16="http://schemas.microsoft.com/office/drawing/2014/main" id="{6CE6BE02-73E1-4A0E-B329-9DFC1AB22986}"/>
+                <a16:creationId xmlns:a16="http://schemas.microsoft.com/office/drawing/2014/main" id="{574352A3-B330-4048-8684-6E31DF2A3EF8}"/>
               </a:ext>
             </a:extLst>
           </p:cNvPr>
@@ -4154,7 +4059,163 @@
             <a:spLocks noGrp="1"/>
           </p:cNvSpPr>
           <p:nvPr>
-            <p:ph type="ftr" sz="quarter" idx="11"/>
+            <p:ph type="title"/>
+          </p:nvPr>
+        </p:nvSpPr>
+        <p:spPr/>
+        <p:txBody>
+          <a:bodyPr/>
+          <a:lstStyle/>
+          <a:p>
+            <a:r>
+              <a:rPr lang="en-US" dirty="0"/>
+              <a:t>Private Registry info</a:t>
+            </a:r>
+          </a:p>
+        </p:txBody>
+      </p:sp>
+      <p:sp>
+        <p:nvSpPr>
+          <p:cNvPr id="3" name="Content Placeholder 2">
+            <a:extLst>
+              <a:ext uri="{FF2B5EF4-FFF2-40B4-BE49-F238E27FC236}">
+                <a16:creationId xmlns:a16="http://schemas.microsoft.com/office/drawing/2014/main" id="{618E685F-3A32-4D48-BE58-BFC077369B82}"/>
+              </a:ext>
+            </a:extLst>
+          </p:cNvPr>
+          <p:cNvSpPr>
+            <a:spLocks noGrp="1"/>
+          </p:cNvSpPr>
+          <p:nvPr>
+            <p:ph idx="1"/>
+          </p:nvPr>
+        </p:nvSpPr>
+        <p:spPr>
+          <a:xfrm>
+            <a:off x="457200" y="1600201"/>
+            <a:ext cx="8229600" cy="4190999"/>
+          </a:xfrm>
+        </p:spPr>
+        <p:txBody>
+          <a:bodyPr/>
+          <a:lstStyle/>
+          <a:p>
+            <a:pPr marL="0" indent="0">
+              <a:buNone/>
+            </a:pPr>
+            <a:r>
+              <a:rPr lang="en-US" dirty="0"/>
+              <a:t>FQDN:</a:t>
+            </a:r>
+          </a:p>
+          <a:p>
+            <a:pPr marL="400050" lvl="1" indent="0">
+              <a:buNone/>
+            </a:pPr>
+            <a:r>
+              <a:rPr lang="en-US" dirty="0">
+                <a:solidFill>
+                  <a:srgbClr val="0070C0"/>
+                </a:solidFill>
+              </a:rPr>
+              <a:t>zoecontainerreg.azurecr.io</a:t>
+            </a:r>
+            <a:endParaRPr lang="en-US" dirty="0"/>
+          </a:p>
+          <a:p>
+            <a:pPr marL="0" indent="0">
+              <a:buNone/>
+            </a:pPr>
+            <a:r>
+              <a:rPr lang="en-US" dirty="0"/>
+              <a:t>Username:</a:t>
+            </a:r>
+          </a:p>
+          <a:p>
+            <a:pPr marL="400050" lvl="1" indent="0">
+              <a:buNone/>
+            </a:pPr>
+            <a:r>
+              <a:rPr lang="en-US" dirty="0" err="1">
+                <a:solidFill>
+                  <a:srgbClr val="0070C0"/>
+                </a:solidFill>
+              </a:rPr>
+              <a:t>zoecontainerreg</a:t>
+            </a:r>
+            <a:endParaRPr lang="en-US" dirty="0">
+              <a:solidFill>
+                <a:srgbClr val="0070C0"/>
+              </a:solidFill>
+            </a:endParaRPr>
+          </a:p>
+          <a:p>
+            <a:pPr marL="0" indent="0">
+              <a:buNone/>
+            </a:pPr>
+            <a:r>
+              <a:rPr lang="en-US" dirty="0"/>
+              <a:t>Password:</a:t>
+            </a:r>
+          </a:p>
+          <a:p>
+            <a:pPr marL="400050" lvl="1" indent="0">
+              <a:buNone/>
+            </a:pPr>
+            <a:r>
+              <a:rPr lang="en-US" dirty="0">
+                <a:solidFill>
+                  <a:srgbClr val="0070C0"/>
+                </a:solidFill>
+              </a:rPr>
+              <a:t>TLCj2xrtLjR8ajml0UN=OeXuMdL8kxYH</a:t>
+            </a:r>
+          </a:p>
+        </p:txBody>
+      </p:sp>
+      <p:sp>
+        <p:nvSpPr>
+          <p:cNvPr id="4" name="Slide Number Placeholder 3">
+            <a:extLst>
+              <a:ext uri="{FF2B5EF4-FFF2-40B4-BE49-F238E27FC236}">
+                <a16:creationId xmlns:a16="http://schemas.microsoft.com/office/drawing/2014/main" id="{700E5982-356B-4187-83F6-4E7A14E37056}"/>
+              </a:ext>
+            </a:extLst>
+          </p:cNvPr>
+          <p:cNvSpPr>
+            <a:spLocks noGrp="1"/>
+          </p:cNvSpPr>
+          <p:nvPr>
+            <p:ph type="sldNum" sz="quarter" idx="12"/>
+          </p:nvPr>
+        </p:nvSpPr>
+        <p:spPr/>
+        <p:txBody>
+          <a:bodyPr/>
+          <a:lstStyle/>
+          <a:p>
+            <a:fld id="{8848E627-D06A-4F0E-98E2-3D90458BE48C}" type="slidenum">
+              <a:rPr lang="en-US" smtClean="0"/>
+              <a:t>15</a:t>
+            </a:fld>
+            <a:endParaRPr lang="en-US"/>
+          </a:p>
+        </p:txBody>
+      </p:sp>
+      <p:sp>
+        <p:nvSpPr>
+          <p:cNvPr id="5" name="Footer Placeholder 4">
+            <a:extLst>
+              <a:ext uri="{FF2B5EF4-FFF2-40B4-BE49-F238E27FC236}">
+                <a16:creationId xmlns:a16="http://schemas.microsoft.com/office/drawing/2014/main" id="{8CA56F73-09AE-4E5D-BE5F-243A720DD605}"/>
+              </a:ext>
+            </a:extLst>
+          </p:cNvPr>
+          <p:cNvSpPr>
+            <a:spLocks noGrp="1"/>
+          </p:cNvSpPr>
+          <p:nvPr>
+            <p:ph type="ftr" sz="quarter" idx="3"/>
           </p:nvPr>
         </p:nvSpPr>
         <p:spPr/>
@@ -4172,10 +4233,10 @@
       </p:sp>
       <p:sp>
         <p:nvSpPr>
-          <p:cNvPr id="3" name="Slide Number Placeholder 2">
+          <p:cNvPr id="6" name="Date Placeholder 5">
             <a:extLst>
               <a:ext uri="{FF2B5EF4-FFF2-40B4-BE49-F238E27FC236}">
-                <a16:creationId xmlns:a16="http://schemas.microsoft.com/office/drawing/2014/main" id="{7540321A-00F5-4DE9-BA8E-860222ACD643}"/>
+                <a16:creationId xmlns:a16="http://schemas.microsoft.com/office/drawing/2014/main" id="{6979DE41-14A4-47B6-B6EC-C46BB20EBA90}"/>
               </a:ext>
             </a:extLst>
           </p:cNvPr>
@@ -4183,135 +4244,18 @@
             <a:spLocks noGrp="1"/>
           </p:cNvSpPr>
           <p:nvPr>
-            <p:ph type="sldNum" sz="quarter" idx="12"/>
-          </p:nvPr>
-        </p:nvSpPr>
-        <p:spPr/>
-        <p:txBody>
-          <a:bodyPr/>
-          <a:lstStyle/>
-          <a:p>
-            <a:fld id="{8848E627-D06A-4F0E-98E2-3D90458BE48C}" type="slidenum">
+            <p:ph type="dt" sz="half" idx="10"/>
+          </p:nvPr>
+        </p:nvSpPr>
+        <p:spPr/>
+        <p:txBody>
+          <a:bodyPr/>
+          <a:lstStyle/>
+          <a:p>
+            <a:fld id="{CAEF89AF-97FF-41FD-A810-843DAB910B39}" type="datetime4">
               <a:rPr lang="en-US" smtClean="0"/>
-              <a:pPr/>
-              <a:t>15</a:t>
+              <a:t>July 29, 2019</a:t>
             </a:fld>
-            <a:endParaRPr lang="en-US" dirty="0"/>
-          </a:p>
-        </p:txBody>
-      </p:sp>
-      <p:sp>
-        <p:nvSpPr>
-          <p:cNvPr id="4" name="Date Placeholder 3">
-            <a:extLst>
-              <a:ext uri="{FF2B5EF4-FFF2-40B4-BE49-F238E27FC236}">
-                <a16:creationId xmlns:a16="http://schemas.microsoft.com/office/drawing/2014/main" id="{8FBFE721-675E-4D7A-9A7F-BA59DA7625A1}"/>
-              </a:ext>
-            </a:extLst>
-          </p:cNvPr>
-          <p:cNvSpPr>
-            <a:spLocks noGrp="1"/>
-          </p:cNvSpPr>
-          <p:nvPr>
-            <p:ph type="dt" sz="half" idx="10"/>
-          </p:nvPr>
-        </p:nvSpPr>
-        <p:spPr/>
-        <p:txBody>
-          <a:bodyPr/>
-          <a:lstStyle/>
-          <a:p>
-            <a:fld id="{4D013C2E-F697-4ACF-9974-2B7ED63A336A}" type="datetime4">
-              <a:rPr lang="en-US" smtClean="0"/>
-              <a:t>July 22, 2019</a:t>
-            </a:fld>
-            <a:endParaRPr lang="en-US" dirty="0"/>
-          </a:p>
-        </p:txBody>
-      </p:sp>
-      <p:sp>
-        <p:nvSpPr>
-          <p:cNvPr id="5" name="TextBox 4">
-            <a:extLst>
-              <a:ext uri="{FF2B5EF4-FFF2-40B4-BE49-F238E27FC236}">
-                <a16:creationId xmlns:a16="http://schemas.microsoft.com/office/drawing/2014/main" id="{07ACCFA9-B01C-4F2B-8665-7A869BCA9F6A}"/>
-              </a:ext>
-            </a:extLst>
-          </p:cNvPr>
-          <p:cNvSpPr txBox="1"/>
-          <p:nvPr/>
-        </p:nvSpPr>
-        <p:spPr>
-          <a:xfrm>
-            <a:off x="685800" y="1524000"/>
-            <a:ext cx="7772400" cy="3139321"/>
-          </a:xfrm>
-          <a:prstGeom prst="rect">
-            <a:avLst/>
-          </a:prstGeom>
-          <a:noFill/>
-        </p:spPr>
-        <p:txBody>
-          <a:bodyPr wrap="square" rtlCol="0">
-            <a:spAutoFit/>
-          </a:bodyPr>
-          <a:lstStyle/>
-          <a:p>
-            <a:r>
-              <a:rPr lang="en-US" b="1" dirty="0"/>
-              <a:t>Private Docker Registry Info:</a:t>
-            </a:r>
-          </a:p>
-          <a:p>
-            <a:endParaRPr lang="en-US" dirty="0"/>
-          </a:p>
-          <a:p>
-            <a:r>
-              <a:rPr lang="en-US" dirty="0"/>
-              <a:t>Username:</a:t>
-            </a:r>
-          </a:p>
-          <a:p>
-            <a:r>
-              <a:rPr lang="en-US" dirty="0"/>
-              <a:t>Teacontainerlab001</a:t>
-            </a:r>
-          </a:p>
-          <a:p>
-            <a:endParaRPr lang="en-US" dirty="0"/>
-          </a:p>
-          <a:p>
-            <a:r>
-              <a:rPr lang="en-US" dirty="0"/>
-              <a:t>Password:</a:t>
-            </a:r>
-          </a:p>
-          <a:p>
-            <a:r>
-              <a:rPr lang="en-US" dirty="0" err="1"/>
-              <a:t>TkxH</a:t>
-            </a:r>
-            <a:r>
-              <a:rPr lang="en-US" dirty="0"/>
-              <a:t>=AFxYPs8p+MZA9M2FEoxljFtm4Ye</a:t>
-            </a:r>
-          </a:p>
-          <a:p>
-            <a:endParaRPr lang="en-US" dirty="0"/>
-          </a:p>
-          <a:p>
-            <a:r>
-              <a:rPr lang="en-US" dirty="0"/>
-              <a:t>FQDN:</a:t>
-            </a:r>
-          </a:p>
-          <a:p>
-            <a:r>
-              <a:rPr lang="en-US" dirty="0"/>
-              <a:t>teacontainerlab001.azurecr.io</a:t>
-            </a:r>
-          </a:p>
-          <a:p>
             <a:endParaRPr lang="en-US" dirty="0"/>
           </a:p>
         </p:txBody>
@@ -4319,7 +4263,7 @@
     </p:spTree>
     <p:extLst>
       <p:ext uri="{BB962C8B-B14F-4D97-AF65-F5344CB8AC3E}">
-        <p14:creationId xmlns:p14="http://schemas.microsoft.com/office/powerpoint/2010/main" val="977634675"/>
+        <p14:creationId xmlns:p14="http://schemas.microsoft.com/office/powerpoint/2010/main" val="4065564631"/>
       </p:ext>
     </p:extLst>
   </p:cSld>
@@ -4348,7 +4292,42 @@
       </p:grpSpPr>
       <p:sp>
         <p:nvSpPr>
-          <p:cNvPr id="2" name="Slide Number Placeholder 1"/>
+          <p:cNvPr id="2" name="Footer Placeholder 1">
+            <a:extLst>
+              <a:ext uri="{FF2B5EF4-FFF2-40B4-BE49-F238E27FC236}">
+                <a16:creationId xmlns:a16="http://schemas.microsoft.com/office/drawing/2014/main" id="{6CE6BE02-73E1-4A0E-B329-9DFC1AB22986}"/>
+              </a:ext>
+            </a:extLst>
+          </p:cNvPr>
+          <p:cNvSpPr>
+            <a:spLocks noGrp="1"/>
+          </p:cNvSpPr>
+          <p:nvPr>
+            <p:ph type="ftr" sz="quarter" idx="11"/>
+          </p:nvPr>
+        </p:nvSpPr>
+        <p:spPr/>
+        <p:txBody>
+          <a:bodyPr/>
+          <a:lstStyle/>
+          <a:p>
+            <a:r>
+              <a:rPr lang="en-US"/>
+              <a:t>CONFIDENTIAL &amp; PROPRIETARY</a:t>
+            </a:r>
+            <a:endParaRPr lang="en-US" dirty="0"/>
+          </a:p>
+        </p:txBody>
+      </p:sp>
+      <p:sp>
+        <p:nvSpPr>
+          <p:cNvPr id="3" name="Slide Number Placeholder 2">
+            <a:extLst>
+              <a:ext uri="{FF2B5EF4-FFF2-40B4-BE49-F238E27FC236}">
+                <a16:creationId xmlns:a16="http://schemas.microsoft.com/office/drawing/2014/main" id="{7540321A-00F5-4DE9-BA8E-860222ACD643}"/>
+              </a:ext>
+            </a:extLst>
+          </p:cNvPr>
           <p:cNvSpPr>
             <a:spLocks noGrp="1"/>
           </p:cNvSpPr>
@@ -4361,7 +4340,7 @@
           <a:bodyPr/>
           <a:lstStyle/>
           <a:p>
-            <a:fld id="{4FAB73BC-B049-4115-A692-8D63A059BFB8}" type="slidenum">
+            <a:fld id="{8848E627-D06A-4F0E-98E2-3D90458BE48C}" type="slidenum">
               <a:rPr lang="en-US" smtClean="0"/>
               <a:pPr/>
               <a:t>16</a:t>
@@ -4372,6 +4351,260 @@
       </p:sp>
       <p:sp>
         <p:nvSpPr>
+          <p:cNvPr id="4" name="Date Placeholder 3">
+            <a:extLst>
+              <a:ext uri="{FF2B5EF4-FFF2-40B4-BE49-F238E27FC236}">
+                <a16:creationId xmlns:a16="http://schemas.microsoft.com/office/drawing/2014/main" id="{8FBFE721-675E-4D7A-9A7F-BA59DA7625A1}"/>
+              </a:ext>
+            </a:extLst>
+          </p:cNvPr>
+          <p:cNvSpPr>
+            <a:spLocks noGrp="1"/>
+          </p:cNvSpPr>
+          <p:nvPr>
+            <p:ph type="dt" sz="half" idx="10"/>
+          </p:nvPr>
+        </p:nvSpPr>
+        <p:spPr/>
+        <p:txBody>
+          <a:bodyPr/>
+          <a:lstStyle/>
+          <a:p>
+            <a:fld id="{4D013C2E-F697-4ACF-9974-2B7ED63A336A}" type="datetime4">
+              <a:rPr lang="en-US" smtClean="0"/>
+              <a:t>July 29, 2019</a:t>
+            </a:fld>
+            <a:endParaRPr lang="en-US" dirty="0"/>
+          </a:p>
+        </p:txBody>
+      </p:sp>
+      <p:sp>
+        <p:nvSpPr>
+          <p:cNvPr id="5" name="TextBox 4">
+            <a:extLst>
+              <a:ext uri="{FF2B5EF4-FFF2-40B4-BE49-F238E27FC236}">
+                <a16:creationId xmlns:a16="http://schemas.microsoft.com/office/drawing/2014/main" id="{07ACCFA9-B01C-4F2B-8665-7A869BCA9F6A}"/>
+              </a:ext>
+            </a:extLst>
+          </p:cNvPr>
+          <p:cNvSpPr txBox="1"/>
+          <p:nvPr/>
+        </p:nvSpPr>
+        <p:spPr>
+          <a:xfrm>
+            <a:off x="685800" y="1524000"/>
+            <a:ext cx="4648200" cy="4247317"/>
+          </a:xfrm>
+          <a:prstGeom prst="rect">
+            <a:avLst/>
+          </a:prstGeom>
+          <a:noFill/>
+        </p:spPr>
+        <p:txBody>
+          <a:bodyPr wrap="square" rtlCol="0">
+            <a:spAutoFit/>
+          </a:bodyPr>
+          <a:lstStyle/>
+          <a:p>
+            <a:r>
+              <a:rPr lang="en-US" b="1" dirty="0"/>
+              <a:t>Resource Location:</a:t>
+            </a:r>
+          </a:p>
+          <a:p>
+            <a:endParaRPr lang="en-US" dirty="0"/>
+          </a:p>
+          <a:p>
+            <a:r>
+              <a:rPr lang="en-US" dirty="0"/>
+              <a:t>https://github.com/zoenurel/Containers-Temp</a:t>
+            </a:r>
+          </a:p>
+          <a:p>
+            <a:endParaRPr lang="en-US" b="1" dirty="0"/>
+          </a:p>
+          <a:p>
+            <a:r>
+              <a:rPr lang="en-US" b="1" dirty="0"/>
+              <a:t>Private Docker Registry Info:</a:t>
+            </a:r>
+          </a:p>
+          <a:p>
+            <a:endParaRPr lang="en-US" dirty="0"/>
+          </a:p>
+          <a:p>
+            <a:r>
+              <a:rPr lang="en-US" dirty="0"/>
+              <a:t>Username:</a:t>
+            </a:r>
+          </a:p>
+          <a:p>
+            <a:r>
+              <a:rPr lang="en-US" dirty="0"/>
+              <a:t>Teacontainerlab001</a:t>
+            </a:r>
+          </a:p>
+          <a:p>
+            <a:endParaRPr lang="en-US" dirty="0"/>
+          </a:p>
+          <a:p>
+            <a:r>
+              <a:rPr lang="en-US" dirty="0"/>
+              <a:t>Password:</a:t>
+            </a:r>
+          </a:p>
+          <a:p>
+            <a:r>
+              <a:rPr lang="en-US" dirty="0" err="1"/>
+              <a:t>TkxH</a:t>
+            </a:r>
+            <a:r>
+              <a:rPr lang="en-US" dirty="0"/>
+              <a:t>=AFxYPs8p+MZA9M2FEoxljFtm4Ye</a:t>
+            </a:r>
+          </a:p>
+          <a:p>
+            <a:endParaRPr lang="en-US" dirty="0"/>
+          </a:p>
+          <a:p>
+            <a:r>
+              <a:rPr lang="en-US" dirty="0"/>
+              <a:t>FQDN:</a:t>
+            </a:r>
+          </a:p>
+          <a:p>
+            <a:r>
+              <a:rPr lang="en-US" dirty="0"/>
+              <a:t>teacontainerlab001.azurecr.io</a:t>
+            </a:r>
+          </a:p>
+          <a:p>
+            <a:endParaRPr lang="en-US" dirty="0"/>
+          </a:p>
+        </p:txBody>
+      </p:sp>
+      <p:sp>
+        <p:nvSpPr>
+          <p:cNvPr id="7" name="TextBox 6">
+            <a:extLst>
+              <a:ext uri="{FF2B5EF4-FFF2-40B4-BE49-F238E27FC236}">
+                <a16:creationId xmlns:a16="http://schemas.microsoft.com/office/drawing/2014/main" id="{B9DC3618-AECA-4AE7-923F-23A1E2A50DDE}"/>
+              </a:ext>
+            </a:extLst>
+          </p:cNvPr>
+          <p:cNvSpPr txBox="1"/>
+          <p:nvPr/>
+        </p:nvSpPr>
+        <p:spPr>
+          <a:xfrm>
+            <a:off x="5638800" y="1524000"/>
+            <a:ext cx="3124200" cy="2031325"/>
+          </a:xfrm>
+          <a:prstGeom prst="rect">
+            <a:avLst/>
+          </a:prstGeom>
+          <a:noFill/>
+        </p:spPr>
+        <p:txBody>
+          <a:bodyPr wrap="square" rtlCol="0">
+            <a:spAutoFit/>
+          </a:bodyPr>
+          <a:lstStyle/>
+          <a:p>
+            <a:r>
+              <a:rPr lang="en-US" b="1" dirty="0"/>
+              <a:t>LAB VM Credentials:</a:t>
+            </a:r>
+          </a:p>
+          <a:p>
+            <a:endParaRPr lang="en-US" dirty="0"/>
+          </a:p>
+          <a:p>
+            <a:r>
+              <a:rPr lang="en-US" dirty="0"/>
+              <a:t>Username:</a:t>
+            </a:r>
+          </a:p>
+          <a:p>
+            <a:r>
+              <a:rPr lang="en-US" dirty="0" err="1"/>
+              <a:t>Dockeradmin</a:t>
+            </a:r>
+            <a:endParaRPr lang="en-US" dirty="0"/>
+          </a:p>
+          <a:p>
+            <a:endParaRPr lang="en-US" dirty="0"/>
+          </a:p>
+          <a:p>
+            <a:r>
+              <a:rPr lang="en-US" dirty="0"/>
+              <a:t>Password:</a:t>
+            </a:r>
+          </a:p>
+          <a:p>
+            <a:r>
+              <a:rPr lang="en-US" dirty="0"/>
+              <a:t>!@Password</a:t>
+            </a:r>
+          </a:p>
+        </p:txBody>
+      </p:sp>
+    </p:spTree>
+    <p:extLst>
+      <p:ext uri="{BB962C8B-B14F-4D97-AF65-F5344CB8AC3E}">
+        <p14:creationId xmlns:p14="http://schemas.microsoft.com/office/powerpoint/2010/main" val="977634675"/>
+      </p:ext>
+    </p:extLst>
+  </p:cSld>
+  <p:clrMapOvr>
+    <a:masterClrMapping/>
+  </p:clrMapOvr>
+</p:sld>
+</file>
+
+<file path=ppt/slides/slide17.xml><?xml version="1.0" encoding="utf-8"?>
+<p:sld xmlns:a="http://schemas.openxmlformats.org/drawingml/2006/main" xmlns:r="http://schemas.openxmlformats.org/officeDocument/2006/relationships" xmlns:p="http://schemas.openxmlformats.org/presentationml/2006/main">
+  <p:cSld>
+    <p:spTree>
+      <p:nvGrpSpPr>
+        <p:cNvPr id="1" name=""/>
+        <p:cNvGrpSpPr/>
+        <p:nvPr/>
+      </p:nvGrpSpPr>
+      <p:grpSpPr>
+        <a:xfrm>
+          <a:off x="0" y="0"/>
+          <a:ext cx="0" cy="0"/>
+          <a:chOff x="0" y="0"/>
+          <a:chExt cx="0" cy="0"/>
+        </a:xfrm>
+      </p:grpSpPr>
+      <p:sp>
+        <p:nvSpPr>
+          <p:cNvPr id="2" name="Slide Number Placeholder 1"/>
+          <p:cNvSpPr>
+            <a:spLocks noGrp="1"/>
+          </p:cNvSpPr>
+          <p:nvPr>
+            <p:ph type="sldNum" sz="quarter" idx="12"/>
+          </p:nvPr>
+        </p:nvSpPr>
+        <p:spPr/>
+        <p:txBody>
+          <a:bodyPr/>
+          <a:lstStyle/>
+          <a:p>
+            <a:fld id="{4FAB73BC-B049-4115-A692-8D63A059BFB8}" type="slidenum">
+              <a:rPr lang="en-US" smtClean="0"/>
+              <a:pPr/>
+              <a:t>17</a:t>
+            </a:fld>
+            <a:endParaRPr lang="en-US" dirty="0"/>
+          </a:p>
+        </p:txBody>
+      </p:sp>
+      <p:sp>
+        <p:nvSpPr>
           <p:cNvPr id="3" name="Text Placeholder 2"/>
           <p:cNvSpPr>
             <a:spLocks noGrp="1"/>
@@ -4448,7 +4681,7 @@
           <a:p>
             <a:fld id="{45D4FF91-FBA7-4933-87A4-1CD8E0923612}" type="datetime4">
               <a:rPr lang="en-US" smtClean="0"/>
-              <a:t>July 22, 2019</a:t>
+              <a:t>July 29, 2019</a:t>
             </a:fld>
             <a:endParaRPr lang="en-US" dirty="0"/>
           </a:p>
@@ -4687,7 +4920,7 @@
           <a:p>
             <a:fld id="{CDB6A48C-7D50-4342-AD40-34A91176B866}" type="datetime4">
               <a:rPr lang="en-US" smtClean="0"/>
-              <a:t>July 22, 2019</a:t>
+              <a:t>July 29, 2019</a:t>
             </a:fld>
             <a:endParaRPr lang="en-US" dirty="0"/>
           </a:p>
@@ -4875,7 +5108,7 @@
           <a:p>
             <a:fld id="{CAEF89AF-97FF-41FD-A810-843DAB910B39}" type="datetime4">
               <a:rPr lang="en-US" smtClean="0"/>
-              <a:t>July 22, 2019</a:t>
+              <a:t>July 29, 2019</a:t>
             </a:fld>
             <a:endParaRPr lang="en-US" dirty="0"/>
           </a:p>
@@ -4992,7 +5225,7 @@
           <a:p>
             <a:fld id="{CAEF89AF-97FF-41FD-A810-843DAB910B39}" type="datetime4">
               <a:rPr lang="en-US" smtClean="0"/>
-              <a:t>July 22, 2019</a:t>
+              <a:t>July 29, 2019</a:t>
             </a:fld>
             <a:endParaRPr lang="en-US" dirty="0"/>
           </a:p>
@@ -5146,7 +5379,7 @@
           <a:p>
             <a:fld id="{4D013C2E-F697-4ACF-9974-2B7ED63A336A}" type="datetime4">
               <a:rPr lang="en-US" smtClean="0"/>
-              <a:t>July 22, 2019</a:t>
+              <a:t>July 29, 2019</a:t>
             </a:fld>
             <a:endParaRPr lang="en-US" dirty="0"/>
           </a:p>
@@ -5311,7 +5544,7 @@
           <a:p>
             <a:fld id="{4D013C2E-F697-4ACF-9974-2B7ED63A336A}" type="datetime4">
               <a:rPr lang="en-US" smtClean="0"/>
-              <a:t>July 22, 2019</a:t>
+              <a:t>July 29, 2019</a:t>
             </a:fld>
             <a:endParaRPr lang="en-US" dirty="0"/>
           </a:p>
@@ -5684,7 +5917,7 @@
                 <a:tabLst/>
                 <a:defRPr/>
               </a:pPr>
-              <a:t>July 22, 2019</a:t>
+              <a:t>July 29, 2019</a:t>
             </a:fld>
             <a:endParaRPr kumimoji="0" lang="en-US" sz="800" b="0" i="0" u="none" strike="noStrike" kern="1200" cap="none" spc="0" normalizeH="0" baseline="0" noProof="0" dirty="0">
               <a:ln>
@@ -5780,9 +6013,27 @@
         <p:spPr/>
         <p:txBody>
           <a:bodyPr>
-            <a:normAutofit fontScale="77500" lnSpcReduction="20000"/>
+            <a:normAutofit fontScale="62500" lnSpcReduction="20000"/>
           </a:bodyPr>
           <a:lstStyle/>
+          <a:p>
+            <a:r>
+              <a:rPr lang="en-US" dirty="0"/>
+              <a:t>Fast consistent delivery of software</a:t>
+            </a:r>
+          </a:p>
+          <a:p>
+            <a:r>
+              <a:rPr lang="en-US" dirty="0"/>
+              <a:t>Isolation</a:t>
+            </a:r>
+          </a:p>
+          <a:p>
+            <a:r>
+              <a:rPr lang="en-US" dirty="0"/>
+              <a:t>Highly scalable</a:t>
+            </a:r>
+          </a:p>
           <a:p>
             <a:r>
               <a:rPr lang="en-US" dirty="0"/>
@@ -5806,7 +6057,7 @@
           <a:p>
             <a:r>
               <a:rPr lang="en-US" dirty="0"/>
-              <a:t>Smaller than a VM</a:t>
+              <a:t>Smaller than a VM (Skinny)</a:t>
             </a:r>
           </a:p>
           <a:p>
@@ -5922,7 +6173,7 @@
           <a:p>
             <a:fld id="{CAEF89AF-97FF-41FD-A810-843DAB910B39}" type="datetime4">
               <a:rPr lang="en-US" smtClean="0"/>
-              <a:t>July 22, 2019</a:t>
+              <a:t>July 29, 2019</a:t>
             </a:fld>
             <a:endParaRPr lang="en-US" dirty="0"/>
           </a:p>
@@ -5963,7 +6214,7 @@
           <p:cNvPr id="2" name="Title 1">
             <a:extLst>
               <a:ext uri="{FF2B5EF4-FFF2-40B4-BE49-F238E27FC236}">
-                <a16:creationId xmlns:a16="http://schemas.microsoft.com/office/drawing/2014/main" id="{55B242EB-17CB-46E9-8951-5B8BBB786F77}"/>
+                <a16:creationId xmlns:a16="http://schemas.microsoft.com/office/drawing/2014/main" id="{DBC708D2-E6DE-48B2-8046-AFD954D31D27}"/>
               </a:ext>
             </a:extLst>
           </p:cNvPr>
@@ -5988,65 +6239,10 @@
       </p:sp>
       <p:sp>
         <p:nvSpPr>
-          <p:cNvPr id="3" name="Content Placeholder 2">
+          <p:cNvPr id="4" name="Slide Number Placeholder 3">
             <a:extLst>
               <a:ext uri="{FF2B5EF4-FFF2-40B4-BE49-F238E27FC236}">
-                <a16:creationId xmlns:a16="http://schemas.microsoft.com/office/drawing/2014/main" id="{3ABC1EDF-D970-46FF-8BDD-18CF27B9F687}"/>
-              </a:ext>
-            </a:extLst>
-          </p:cNvPr>
-          <p:cNvSpPr>
-            <a:spLocks noGrp="1"/>
-          </p:cNvSpPr>
-          <p:nvPr>
-            <p:ph idx="1"/>
-          </p:nvPr>
-        </p:nvSpPr>
-        <p:spPr/>
-        <p:txBody>
-          <a:bodyPr/>
-          <a:lstStyle/>
-          <a:p>
-            <a:r>
-              <a:rPr lang="en-US" dirty="0"/>
-              <a:t>3 Main Concepts</a:t>
-            </a:r>
-          </a:p>
-          <a:p>
-            <a:pPr lvl="1"/>
-            <a:r>
-              <a:rPr lang="en-US" dirty="0"/>
-              <a:t>Images</a:t>
-            </a:r>
-          </a:p>
-          <a:p>
-            <a:pPr lvl="1"/>
-            <a:r>
-              <a:rPr lang="en-US" dirty="0"/>
-              <a:t>Containers</a:t>
-            </a:r>
-          </a:p>
-          <a:p>
-            <a:pPr lvl="1"/>
-            <a:r>
-              <a:rPr lang="en-US" dirty="0"/>
-              <a:t>Registry</a:t>
-            </a:r>
-          </a:p>
-          <a:p>
-            <a:pPr marL="0" indent="0">
-              <a:buNone/>
-            </a:pPr>
-            <a:endParaRPr lang="en-US" dirty="0"/>
-          </a:p>
-        </p:txBody>
-      </p:sp>
-      <p:sp>
-        <p:nvSpPr>
-          <p:cNvPr id="4" name="Slide Number Placeholder 3">
-            <a:extLst>
-              <a:ext uri="{FF2B5EF4-FFF2-40B4-BE49-F238E27FC236}">
-                <a16:creationId xmlns:a16="http://schemas.microsoft.com/office/drawing/2014/main" id="{48563A65-BC2A-427C-8881-3517577598FA}"/>
+                <a16:creationId xmlns:a16="http://schemas.microsoft.com/office/drawing/2014/main" id="{E586C5ED-DFA6-445A-BACF-0955E8E84D73}"/>
               </a:ext>
             </a:extLst>
           </p:cNvPr>
@@ -6075,7 +6271,7 @@
           <p:cNvPr id="5" name="Footer Placeholder 4">
             <a:extLst>
               <a:ext uri="{FF2B5EF4-FFF2-40B4-BE49-F238E27FC236}">
-                <a16:creationId xmlns:a16="http://schemas.microsoft.com/office/drawing/2014/main" id="{40978927-F520-4BFB-B8EB-BE220B1F972E}"/>
+                <a16:creationId xmlns:a16="http://schemas.microsoft.com/office/drawing/2014/main" id="{1C06B2B2-0C88-4846-92F3-33E77B3944A3}"/>
               </a:ext>
             </a:extLst>
           </p:cNvPr>
@@ -6104,7 +6300,7 @@
           <p:cNvPr id="6" name="Date Placeholder 5">
             <a:extLst>
               <a:ext uri="{FF2B5EF4-FFF2-40B4-BE49-F238E27FC236}">
-                <a16:creationId xmlns:a16="http://schemas.microsoft.com/office/drawing/2014/main" id="{6607CB85-0347-454B-B841-86AE59B990E1}"/>
+                <a16:creationId xmlns:a16="http://schemas.microsoft.com/office/drawing/2014/main" id="{41D039A1-5954-4074-B982-44201A353F1C}"/>
               </a:ext>
             </a:extLst>
           </p:cNvPr>
@@ -6122,16 +6318,65 @@
           <a:p>
             <a:fld id="{CAEF89AF-97FF-41FD-A810-843DAB910B39}" type="datetime4">
               <a:rPr lang="en-US" smtClean="0"/>
-              <a:t>July 22, 2019</a:t>
+              <a:t>July 29, 2019</a:t>
             </a:fld>
             <a:endParaRPr lang="en-US" dirty="0"/>
           </a:p>
         </p:txBody>
       </p:sp>
+      <p:pic>
+        <p:nvPicPr>
+          <p:cNvPr id="7" name="Picture 2" descr="Docker Engine Components Flow">
+            <a:extLst>
+              <a:ext uri="{FF2B5EF4-FFF2-40B4-BE49-F238E27FC236}">
+                <a16:creationId xmlns:a16="http://schemas.microsoft.com/office/drawing/2014/main" id="{D41ED121-40E9-47E7-8CE3-A2554DB9BD5B}"/>
+              </a:ext>
+            </a:extLst>
+          </p:cNvPr>
+          <p:cNvPicPr>
+            <a:picLocks noGrp="1" noChangeAspect="1" noChangeArrowheads="1"/>
+          </p:cNvPicPr>
+          <p:nvPr>
+            <p:ph idx="1"/>
+          </p:nvPr>
+        </p:nvPicPr>
+        <p:blipFill>
+          <a:blip r:embed="rId2">
+            <a:extLst>
+              <a:ext uri="{28A0092B-C50C-407E-A947-70E740481C1C}">
+                <a14:useLocalDpi xmlns:a14="http://schemas.microsoft.com/office/drawing/2010/main" val="0"/>
+              </a:ext>
+            </a:extLst>
+          </a:blip>
+          <a:srcRect/>
+          <a:stretch>
+            <a:fillRect/>
+          </a:stretch>
+        </p:blipFill>
+        <p:spPr bwMode="auto">
+          <a:xfrm>
+            <a:off x="2228850" y="2029619"/>
+            <a:ext cx="4686300" cy="3667125"/>
+          </a:xfrm>
+          <a:prstGeom prst="rect">
+            <a:avLst/>
+          </a:prstGeom>
+          <a:noFill/>
+          <a:extLst>
+            <a:ext uri="{909E8E84-426E-40DD-AFC4-6F175D3DCCD1}">
+              <a14:hiddenFill xmlns:a14="http://schemas.microsoft.com/office/drawing/2010/main">
+                <a:solidFill>
+                  <a:srgbClr val="FFFFFF"/>
+                </a:solidFill>
+              </a14:hiddenFill>
+            </a:ext>
+          </a:extLst>
+        </p:spPr>
+      </p:pic>
     </p:spTree>
     <p:extLst>
       <p:ext uri="{BB962C8B-B14F-4D97-AF65-F5344CB8AC3E}">
-        <p14:creationId xmlns:p14="http://schemas.microsoft.com/office/powerpoint/2010/main" val="4244891945"/>
+        <p14:creationId xmlns:p14="http://schemas.microsoft.com/office/powerpoint/2010/main" val="1590498117"/>
       </p:ext>
     </p:extLst>
   </p:cSld>
@@ -6712,18 +6957,18 @@
 </file>
 
 <file path=customXml/item1.xml><?xml version="1.0" encoding="utf-8"?>
-<p:properties xmlns:p="http://schemas.microsoft.com/office/2006/metadata/properties" xmlns:xsi="http://www.w3.org/2001/XMLSchema-instance">
-  <documentManagement/>
-</p:properties>
-</file>
-
-<file path=customXml/item2.xml><?xml version="1.0" encoding="utf-8"?>
 <?mso-contentType ?>
 <FormTemplates xmlns="http://schemas.microsoft.com/sharepoint/v3/contenttype/forms">
   <Display>DocumentLibraryForm</Display>
   <Edit>DocumentLibraryForm</Edit>
   <New>DocumentLibraryForm</New>
 </FormTemplates>
+</file>
+
+<file path=customXml/item2.xml><?xml version="1.0" encoding="utf-8"?>
+<p:properties xmlns:p="http://schemas.microsoft.com/office/2006/metadata/properties" xmlns:xsi="http://www.w3.org/2001/XMLSchema-instance">
+  <documentManagement/>
+</p:properties>
 </file>
 
 <file path=customXml/item3.xml><?xml version="1.0" encoding="utf-8"?>
@@ -6776,23 +7021,23 @@
 </file>
 
 <file path=customXml/itemProps1.xml><?xml version="1.0" encoding="utf-8"?>
-<ds:datastoreItem xmlns:ds="http://schemas.openxmlformats.org/officeDocument/2006/customXml" ds:itemID="{F0828FC5-3BE2-4558-96D5-FA8F78BC4585}">
+<ds:datastoreItem xmlns:ds="http://schemas.openxmlformats.org/officeDocument/2006/customXml" ds:itemID="{0CCA081F-75FD-4596-A76A-C0A1B47BD1CB}">
   <ds:schemaRefs>
-    <ds:schemaRef ds:uri="http://purl.org/dc/dcmitype/"/>
-    <ds:schemaRef ds:uri="http://schemas.microsoft.com/office/2006/documentManagement/types"/>
-    <ds:schemaRef ds:uri="http://purl.org/dc/terms/"/>
-    <ds:schemaRef ds:uri="http://schemas.openxmlformats.org/package/2006/metadata/core-properties"/>
-    <ds:schemaRef ds:uri="http://purl.org/dc/elements/1.1/"/>
-    <ds:schemaRef ds:uri="http://schemas.microsoft.com/office/2006/metadata/properties"/>
-    <ds:schemaRef ds:uri="http://www.w3.org/XML/1998/namespace"/>
+    <ds:schemaRef ds:uri="http://schemas.microsoft.com/sharepoint/v3/contenttype/forms"/>
   </ds:schemaRefs>
 </ds:datastoreItem>
 </file>
 
 <file path=customXml/itemProps2.xml><?xml version="1.0" encoding="utf-8"?>
-<ds:datastoreItem xmlns:ds="http://schemas.openxmlformats.org/officeDocument/2006/customXml" ds:itemID="{0CCA081F-75FD-4596-A76A-C0A1B47BD1CB}">
+<ds:datastoreItem xmlns:ds="http://schemas.openxmlformats.org/officeDocument/2006/customXml" ds:itemID="{F0828FC5-3BE2-4558-96D5-FA8F78BC4585}">
   <ds:schemaRefs>
-    <ds:schemaRef ds:uri="http://schemas.microsoft.com/sharepoint/v3/contenttype/forms"/>
+    <ds:schemaRef ds:uri="http://purl.org/dc/dcmitype/"/>
+    <ds:schemaRef ds:uri="http://schemas.openxmlformats.org/package/2006/metadata/core-properties"/>
+    <ds:schemaRef ds:uri="http://purl.org/dc/terms/"/>
+    <ds:schemaRef ds:uri="http://schemas.microsoft.com/office/2006/metadata/properties"/>
+    <ds:schemaRef ds:uri="http://www.w3.org/XML/1998/namespace"/>
+    <ds:schemaRef ds:uri="http://schemas.microsoft.com/office/2006/documentManagement/types"/>
+    <ds:schemaRef ds:uri="http://purl.org/dc/elements/1.1/"/>
   </ds:schemaRefs>
 </ds:datastoreItem>
 </file>

</xml_diff>